<commit_message>
cleaned up a little, added property tags as arg and method to get an ordered list of slides
</commit_message>
<xml_diff>
--- a/assets/test-2.pptx
+++ b/assets/test-2.pptx
@@ -3396,7 +3396,7 @@
           <p:nvPr/>
         </p:nvPicPr>
         <p:blipFill>
-          <a:blip r:embed="Rd50ad89556744549">
+          <a:blip r:embed="Reb5b02c20dde4c78">
             <a:extLst>
               <a:ext uri="{28A0092B-C50C-407E-A947-70E740481C1C}">
                 <a14:useLocalDpi xmlns:a14="http://schemas.microsoft.com/office/drawing/2010/main" val="0"/>
@@ -3432,7 +3432,7 @@
           <p:nvPr/>
         </p:nvPicPr>
         <p:blipFill>
-          <a:blip r:embed="Ra1cce84cc5954022">
+          <a:blip r:embed="Ra0ee226d2c7e4d7d">
             <a:extLst>
               <a:ext uri="{28A0092B-C50C-407E-A947-70E740481C1C}">
                 <a14:useLocalDpi xmlns:a14="http://schemas.microsoft.com/office/drawing/2010/main" val="0"/>
@@ -3468,7 +3468,7 @@
           <p:nvPr/>
         </p:nvPicPr>
         <p:blipFill>
-          <a:blip r:embed="R1b95fb82bc264e3f">
+          <a:blip r:embed="R4cefc153971d4e1e">
             <a:extLst>
               <a:ext uri="{28A0092B-C50C-407E-A947-70E740481C1C}">
                 <a14:useLocalDpi xmlns:a14="http://schemas.microsoft.com/office/drawing/2010/main" val="0"/>

</xml_diff>